<commit_message>
Update Presentacion de Proyecto_WUKY.pptx
Se agregan temas de trimestre ll
</commit_message>
<xml_diff>
--- a/DOCUENTOS VARIOS/PRESENTACIONES/Presentacion de Proyecto_WUKY.pptx
+++ b/DOCUENTOS VARIOS/PRESENTACIONES/Presentacion de Proyecto_WUKY.pptx
@@ -5,7 +5,7 @@
     <p:sldMasterId id="2147483801" r:id="rId1"/>
   </p:sldMasterIdLst>
   <p:notesMasterIdLst>
-    <p:notesMasterId r:id="rId13"/>
+    <p:notesMasterId r:id="rId16"/>
   </p:notesMasterIdLst>
   <p:sldIdLst>
     <p:sldId id="257" r:id="rId2"/>
@@ -19,6 +19,9 @@
     <p:sldId id="269" r:id="rId10"/>
     <p:sldId id="273" r:id="rId11"/>
     <p:sldId id="270" r:id="rId12"/>
+    <p:sldId id="274" r:id="rId13"/>
+    <p:sldId id="276" r:id="rId14"/>
+    <p:sldId id="275" r:id="rId15"/>
   </p:sldIdLst>
   <p:sldSz cx="12192000" cy="6858000"/>
   <p:notesSz cx="6858000" cy="9144000"/>
@@ -207,7 +210,7 @@
           <a:p>
             <a:fld id="{06CCE030-3650-4DF8-A94C-49E86708ABDD}" type="datetimeFigureOut">
               <a:rPr lang="es-CO" smtClean="0"/>
-              <a:t>27/09/2021</a:t>
+              <a:t>15/12/2021</a:t>
             </a:fld>
             <a:endParaRPr lang="es-CO"/>
           </a:p>
@@ -637,7 +640,7 @@
           <a:p>
             <a:fld id="{524C6359-9BB8-4148-8114-537E698DA205}" type="datetime1">
               <a:rPr lang="en-US" smtClean="0"/>
-              <a:t>9/27/2021</a:t>
+              <a:t>12/15/2021</a:t>
             </a:fld>
             <a:endParaRPr lang="en-US" dirty="0"/>
           </a:p>
@@ -1697,7 +1700,7 @@
           <a:p>
             <a:fld id="{A4649BD0-10DB-43E7-8F22-40B3D51B8FC3}" type="datetime1">
               <a:rPr lang="en-US" smtClean="0"/>
-              <a:t>9/27/2021</a:t>
+              <a:t>12/15/2021</a:t>
             </a:fld>
             <a:endParaRPr lang="en-US" dirty="0"/>
           </a:p>
@@ -2758,7 +2761,7 @@
           <a:p>
             <a:fld id="{0A16C79C-F566-427A-93F6-434A4E613134}" type="datetime1">
               <a:rPr lang="en-US" smtClean="0"/>
-              <a:t>9/27/2021</a:t>
+              <a:t>12/15/2021</a:t>
             </a:fld>
             <a:endParaRPr lang="en-US" dirty="0"/>
           </a:p>
@@ -3814,7 +3817,7 @@
           <a:p>
             <a:fld id="{9376191F-481E-48E9-BB9A-369A67A7362D}" type="datetime1">
               <a:rPr lang="en-US" smtClean="0"/>
-              <a:t>9/27/2021</a:t>
+              <a:t>12/15/2021</a:t>
             </a:fld>
             <a:endParaRPr lang="en-US" dirty="0"/>
           </a:p>
@@ -4943,7 +4946,7 @@
           <a:p>
             <a:fld id="{6C5677DE-DD04-48CC-9C18-7BE9FF2DEB6B}" type="datetime1">
               <a:rPr lang="en-US" smtClean="0"/>
-              <a:t>9/27/2021</a:t>
+              <a:t>12/15/2021</a:t>
             </a:fld>
             <a:endParaRPr lang="en-US" dirty="0"/>
           </a:p>
@@ -6062,7 +6065,7 @@
           <a:p>
             <a:fld id="{463255ED-7101-4D18-A8AE-3B5E4CB87EA5}" type="datetime1">
               <a:rPr lang="en-US" smtClean="0"/>
-              <a:t>9/27/2021</a:t>
+              <a:t>12/15/2021</a:t>
             </a:fld>
             <a:endParaRPr lang="en-US" dirty="0"/>
           </a:p>
@@ -7368,7 +7371,7 @@
           <a:p>
             <a:fld id="{CD52F23D-51F6-4C94-8CD5-B9ABBF67EE23}" type="datetime1">
               <a:rPr lang="en-US" smtClean="0"/>
-              <a:t>9/27/2021</a:t>
+              <a:t>12/15/2021</a:t>
             </a:fld>
             <a:endParaRPr lang="en-US" dirty="0"/>
           </a:p>
@@ -7515,7 +7518,7 @@
           <a:p>
             <a:fld id="{D51A702F-6367-4FD1-89A8-3744BE6BA9A2}" type="datetime1">
               <a:rPr lang="en-US" smtClean="0"/>
-              <a:t>9/27/2021</a:t>
+              <a:t>12/15/2021</a:t>
             </a:fld>
             <a:endParaRPr lang="en-US" dirty="0"/>
           </a:p>
@@ -8479,7 +8482,7 @@
           <a:p>
             <a:fld id="{4A6E99BD-4B4F-4460-B452-0E8146ACCF8F}" type="datetime1">
               <a:rPr lang="en-US" smtClean="0"/>
-              <a:t>9/27/2021</a:t>
+              <a:t>12/15/2021</a:t>
             </a:fld>
             <a:endParaRPr lang="en-US" dirty="0"/>
           </a:p>
@@ -8798,7 +8801,7 @@
           <a:p>
             <a:fld id="{EB6FD34C-1867-42A9-AC54-D15ADD8A65E7}" type="datetime1">
               <a:rPr lang="en-US" smtClean="0"/>
-              <a:t>9/27/2021</a:t>
+              <a:t>12/15/2021</a:t>
             </a:fld>
             <a:endParaRPr lang="en-US" dirty="0"/>
           </a:p>
@@ -9945,7 +9948,7 @@
           <a:p>
             <a:fld id="{336133E9-A654-4C17-8C3C-DDCAC83D6EBF}" type="datetime1">
               <a:rPr lang="en-US" smtClean="0"/>
-              <a:t>9/27/2021</a:t>
+              <a:t>12/15/2021</a:t>
             </a:fld>
             <a:endParaRPr lang="en-US" dirty="0"/>
           </a:p>
@@ -12355,7 +12358,7 @@
           <a:p>
             <a:fld id="{8769D389-4C4C-4FD7-9E6B-9F44477F0EB8}" type="datetime1">
               <a:rPr lang="en-US" smtClean="0"/>
-              <a:t>9/27/2021</a:t>
+              <a:t>12/15/2021</a:t>
             </a:fld>
             <a:endParaRPr lang="en-US" dirty="0"/>
           </a:p>
@@ -20255,6 +20258,429 @@
     <p:extLst>
       <p:ext uri="{BB962C8B-B14F-4D97-AF65-F5344CB8AC3E}">
         <p14:creationId xmlns:p14="http://schemas.microsoft.com/office/powerpoint/2010/main" val="499652934"/>
+      </p:ext>
+    </p:extLst>
+  </p:cSld>
+  <p:clrMapOvr>
+    <a:masterClrMapping/>
+  </p:clrMapOvr>
+</p:sld>
+</file>
+
+<file path=ppt/slides/slide12.xml><?xml version="1.0" encoding="utf-8"?>
+<p:sld xmlns:a="http://schemas.openxmlformats.org/drawingml/2006/main" xmlns:r="http://schemas.openxmlformats.org/officeDocument/2006/relationships" xmlns:p="http://schemas.openxmlformats.org/presentationml/2006/main">
+  <p:cSld>
+    <p:spTree>
+      <p:nvGrpSpPr>
+        <p:cNvPr id="1" name=""/>
+        <p:cNvGrpSpPr/>
+        <p:nvPr/>
+      </p:nvGrpSpPr>
+      <p:grpSpPr>
+        <a:xfrm>
+          <a:off x="0" y="0"/>
+          <a:ext cx="0" cy="0"/>
+          <a:chOff x="0" y="0"/>
+          <a:chExt cx="0" cy="0"/>
+        </a:xfrm>
+      </p:grpSpPr>
+      <p:sp>
+        <p:nvSpPr>
+          <p:cNvPr id="4" name="CuadroTexto 3">
+            <a:extLst>
+              <a:ext uri="{FF2B5EF4-FFF2-40B4-BE49-F238E27FC236}">
+                <a16:creationId xmlns:a16="http://schemas.microsoft.com/office/drawing/2014/main" id="{D5D82764-B081-4ACB-8392-1DCA2A620622}"/>
+              </a:ext>
+            </a:extLst>
+          </p:cNvPr>
+          <p:cNvSpPr txBox="1"/>
+          <p:nvPr/>
+        </p:nvSpPr>
+        <p:spPr>
+          <a:xfrm>
+            <a:off x="2020010" y="453525"/>
+            <a:ext cx="9149738" cy="707886"/>
+          </a:xfrm>
+          <a:prstGeom prst="rect">
+            <a:avLst/>
+          </a:prstGeom>
+          <a:noFill/>
+        </p:spPr>
+        <p:txBody>
+          <a:bodyPr wrap="square" rtlCol="0">
+            <a:spAutoFit/>
+          </a:bodyPr>
+          <a:lstStyle/>
+          <a:p>
+            <a:pPr algn="ctr"/>
+            <a:r>
+              <a:rPr lang="es-ES" sz="4000" i="1" dirty="0">
+                <a:latin typeface="Modern Love Caps" panose="04070805081001020A01" pitchFamily="82" charset="0"/>
+              </a:rPr>
+              <a:t>DIAGRAMA DE CASOS DE USO EXTENDIDO</a:t>
+            </a:r>
+            <a:endParaRPr lang="es-CO" sz="4000" i="1" dirty="0"/>
+          </a:p>
+        </p:txBody>
+      </p:sp>
+      <p:pic>
+        <p:nvPicPr>
+          <p:cNvPr id="5" name="Imagen 4">
+            <a:extLst>
+              <a:ext uri="{FF2B5EF4-FFF2-40B4-BE49-F238E27FC236}">
+                <a16:creationId xmlns:a16="http://schemas.microsoft.com/office/drawing/2014/main" id="{8AA59EDE-8DC6-4D79-95C9-0EAE795C4A5A}"/>
+              </a:ext>
+            </a:extLst>
+          </p:cNvPr>
+          <p:cNvPicPr>
+            <a:picLocks noChangeAspect="1"/>
+          </p:cNvPicPr>
+          <p:nvPr/>
+        </p:nvPicPr>
+        <p:blipFill>
+          <a:blip r:embed="rId2">
+            <a:extLst>
+              <a:ext uri="{28A0092B-C50C-407E-A947-70E740481C1C}">
+                <a14:useLocalDpi xmlns:a14="http://schemas.microsoft.com/office/drawing/2010/main" val="0"/>
+              </a:ext>
+            </a:extLst>
+          </a:blip>
+          <a:stretch>
+            <a:fillRect/>
+          </a:stretch>
+        </p:blipFill>
+        <p:spPr>
+          <a:xfrm>
+            <a:off x="111210" y="130481"/>
+            <a:ext cx="1453349" cy="1353975"/>
+          </a:xfrm>
+          <a:prstGeom prst="rect">
+            <a:avLst/>
+          </a:prstGeom>
+        </p:spPr>
+      </p:pic>
+      <p:pic>
+        <p:nvPicPr>
+          <p:cNvPr id="3" name="Imagen 2" descr="Diagrama&#10;&#10;Descripción generada automáticamente">
+            <a:extLst>
+              <a:ext uri="{FF2B5EF4-FFF2-40B4-BE49-F238E27FC236}">
+                <a16:creationId xmlns:a16="http://schemas.microsoft.com/office/drawing/2014/main" id="{8EA47B27-DD92-499C-BC19-AFE0237B938A}"/>
+              </a:ext>
+            </a:extLst>
+          </p:cNvPr>
+          <p:cNvPicPr>
+            <a:picLocks noChangeAspect="1"/>
+          </p:cNvPicPr>
+          <p:nvPr/>
+        </p:nvPicPr>
+        <p:blipFill>
+          <a:blip r:embed="rId3">
+            <a:extLst>
+              <a:ext uri="{28A0092B-C50C-407E-A947-70E740481C1C}">
+                <a14:useLocalDpi xmlns:a14="http://schemas.microsoft.com/office/drawing/2010/main" val="0"/>
+              </a:ext>
+            </a:extLst>
+          </a:blip>
+          <a:stretch>
+            <a:fillRect/>
+          </a:stretch>
+        </p:blipFill>
+        <p:spPr>
+          <a:xfrm>
+            <a:off x="2691803" y="992087"/>
+            <a:ext cx="7806152" cy="5648325"/>
+          </a:xfrm>
+          <a:prstGeom prst="rect">
+            <a:avLst/>
+          </a:prstGeom>
+        </p:spPr>
+      </p:pic>
+    </p:spTree>
+    <p:extLst>
+      <p:ext uri="{BB962C8B-B14F-4D97-AF65-F5344CB8AC3E}">
+        <p14:creationId xmlns:p14="http://schemas.microsoft.com/office/powerpoint/2010/main" val="2377251396"/>
+      </p:ext>
+    </p:extLst>
+  </p:cSld>
+  <p:clrMapOvr>
+    <a:masterClrMapping/>
+  </p:clrMapOvr>
+</p:sld>
+</file>
+
+<file path=ppt/slides/slide13.xml><?xml version="1.0" encoding="utf-8"?>
+<p:sld xmlns:a="http://schemas.openxmlformats.org/drawingml/2006/main" xmlns:r="http://schemas.openxmlformats.org/officeDocument/2006/relationships" xmlns:p="http://schemas.openxmlformats.org/presentationml/2006/main">
+  <p:cSld>
+    <p:spTree>
+      <p:nvGrpSpPr>
+        <p:cNvPr id="1" name=""/>
+        <p:cNvGrpSpPr/>
+        <p:nvPr/>
+      </p:nvGrpSpPr>
+      <p:grpSpPr>
+        <a:xfrm>
+          <a:off x="0" y="0"/>
+          <a:ext cx="0" cy="0"/>
+          <a:chOff x="0" y="0"/>
+          <a:chExt cx="0" cy="0"/>
+        </a:xfrm>
+      </p:grpSpPr>
+      <p:sp>
+        <p:nvSpPr>
+          <p:cNvPr id="4" name="CuadroTexto 3">
+            <a:extLst>
+              <a:ext uri="{FF2B5EF4-FFF2-40B4-BE49-F238E27FC236}">
+                <a16:creationId xmlns:a16="http://schemas.microsoft.com/office/drawing/2014/main" id="{D5D82764-B081-4ACB-8392-1DCA2A620622}"/>
+              </a:ext>
+            </a:extLst>
+          </p:cNvPr>
+          <p:cNvSpPr txBox="1"/>
+          <p:nvPr/>
+        </p:nvSpPr>
+        <p:spPr>
+          <a:xfrm>
+            <a:off x="1991875" y="401776"/>
+            <a:ext cx="9248211" cy="707886"/>
+          </a:xfrm>
+          <a:prstGeom prst="rect">
+            <a:avLst/>
+          </a:prstGeom>
+          <a:noFill/>
+        </p:spPr>
+        <p:txBody>
+          <a:bodyPr wrap="square" rtlCol="0">
+            <a:spAutoFit/>
+          </a:bodyPr>
+          <a:lstStyle/>
+          <a:p>
+            <a:pPr algn="ctr"/>
+            <a:r>
+              <a:rPr lang="es-ES" sz="4000" i="1" dirty="0">
+                <a:latin typeface="Modern Love Caps" panose="04070805081001020A01" pitchFamily="82" charset="0"/>
+              </a:rPr>
+              <a:t>DIAGRAMA DE CASOS DE USO EXTENDIDO</a:t>
+            </a:r>
+            <a:endParaRPr lang="es-CO" sz="4000" i="1" dirty="0"/>
+          </a:p>
+        </p:txBody>
+      </p:sp>
+      <p:pic>
+        <p:nvPicPr>
+          <p:cNvPr id="5" name="Imagen 4">
+            <a:extLst>
+              <a:ext uri="{FF2B5EF4-FFF2-40B4-BE49-F238E27FC236}">
+                <a16:creationId xmlns:a16="http://schemas.microsoft.com/office/drawing/2014/main" id="{8AA59EDE-8DC6-4D79-95C9-0EAE795C4A5A}"/>
+              </a:ext>
+            </a:extLst>
+          </p:cNvPr>
+          <p:cNvPicPr>
+            <a:picLocks noChangeAspect="1"/>
+          </p:cNvPicPr>
+          <p:nvPr/>
+        </p:nvPicPr>
+        <p:blipFill>
+          <a:blip r:embed="rId2">
+            <a:extLst>
+              <a:ext uri="{28A0092B-C50C-407E-A947-70E740481C1C}">
+                <a14:useLocalDpi xmlns:a14="http://schemas.microsoft.com/office/drawing/2010/main" val="0"/>
+              </a:ext>
+            </a:extLst>
+          </a:blip>
+          <a:stretch>
+            <a:fillRect/>
+          </a:stretch>
+        </p:blipFill>
+        <p:spPr>
+          <a:xfrm>
+            <a:off x="111210" y="130481"/>
+            <a:ext cx="1453349" cy="1353975"/>
+          </a:xfrm>
+          <a:prstGeom prst="rect">
+            <a:avLst/>
+          </a:prstGeom>
+        </p:spPr>
+      </p:pic>
+      <p:pic>
+        <p:nvPicPr>
+          <p:cNvPr id="10" name="Imagen 9" descr="Diagrama&#10;&#10;Descripción generada automáticamente">
+            <a:extLst>
+              <a:ext uri="{FF2B5EF4-FFF2-40B4-BE49-F238E27FC236}">
+                <a16:creationId xmlns:a16="http://schemas.microsoft.com/office/drawing/2014/main" id="{C97405B5-B9B4-4D7C-8EE1-901C78382C76}"/>
+              </a:ext>
+            </a:extLst>
+          </p:cNvPr>
+          <p:cNvPicPr>
+            <a:picLocks noChangeAspect="1"/>
+          </p:cNvPicPr>
+          <p:nvPr/>
+        </p:nvPicPr>
+        <p:blipFill>
+          <a:blip r:embed="rId3">
+            <a:extLst>
+              <a:ext uri="{28A0092B-C50C-407E-A947-70E740481C1C}">
+                <a14:useLocalDpi xmlns:a14="http://schemas.microsoft.com/office/drawing/2010/main" val="0"/>
+              </a:ext>
+            </a:extLst>
+          </a:blip>
+          <a:stretch>
+            <a:fillRect/>
+          </a:stretch>
+        </p:blipFill>
+        <p:spPr>
+          <a:xfrm>
+            <a:off x="1991875" y="1292542"/>
+            <a:ext cx="9010842" cy="5721356"/>
+          </a:xfrm>
+          <a:prstGeom prst="rect">
+            <a:avLst/>
+          </a:prstGeom>
+        </p:spPr>
+      </p:pic>
+    </p:spTree>
+    <p:extLst>
+      <p:ext uri="{BB962C8B-B14F-4D97-AF65-F5344CB8AC3E}">
+        <p14:creationId xmlns:p14="http://schemas.microsoft.com/office/powerpoint/2010/main" val="3126750510"/>
+      </p:ext>
+    </p:extLst>
+  </p:cSld>
+  <p:clrMapOvr>
+    <a:masterClrMapping/>
+  </p:clrMapOvr>
+</p:sld>
+</file>
+
+<file path=ppt/slides/slide14.xml><?xml version="1.0" encoding="utf-8"?>
+<p:sld xmlns:a="http://schemas.openxmlformats.org/drawingml/2006/main" xmlns:r="http://schemas.openxmlformats.org/officeDocument/2006/relationships" xmlns:p="http://schemas.openxmlformats.org/presentationml/2006/main">
+  <p:cSld>
+    <p:spTree>
+      <p:nvGrpSpPr>
+        <p:cNvPr id="1" name=""/>
+        <p:cNvGrpSpPr/>
+        <p:nvPr/>
+      </p:nvGrpSpPr>
+      <p:grpSpPr>
+        <a:xfrm>
+          <a:off x="0" y="0"/>
+          <a:ext cx="0" cy="0"/>
+          <a:chOff x="0" y="0"/>
+          <a:chExt cx="0" cy="0"/>
+        </a:xfrm>
+      </p:grpSpPr>
+      <p:sp>
+        <p:nvSpPr>
+          <p:cNvPr id="4" name="CuadroTexto 3">
+            <a:extLst>
+              <a:ext uri="{FF2B5EF4-FFF2-40B4-BE49-F238E27FC236}">
+                <a16:creationId xmlns:a16="http://schemas.microsoft.com/office/drawing/2014/main" id="{D5D82764-B081-4ACB-8392-1DCA2A620622}"/>
+              </a:ext>
+            </a:extLst>
+          </p:cNvPr>
+          <p:cNvSpPr txBox="1"/>
+          <p:nvPr/>
+        </p:nvSpPr>
+        <p:spPr>
+          <a:xfrm>
+            <a:off x="2484244" y="452676"/>
+            <a:ext cx="7640417" cy="707886"/>
+          </a:xfrm>
+          <a:prstGeom prst="rect">
+            <a:avLst/>
+          </a:prstGeom>
+          <a:noFill/>
+        </p:spPr>
+        <p:txBody>
+          <a:bodyPr wrap="square" rtlCol="0">
+            <a:spAutoFit/>
+          </a:bodyPr>
+          <a:lstStyle/>
+          <a:p>
+            <a:pPr algn="ctr"/>
+            <a:r>
+              <a:rPr lang="es-ES" sz="4000" i="1" dirty="0">
+                <a:latin typeface="Modern Love Caps" panose="04070805081001020A01" pitchFamily="82" charset="0"/>
+              </a:rPr>
+              <a:t>MODELO ENTIDAD RELACIÓN</a:t>
+            </a:r>
+            <a:endParaRPr lang="es-CO" sz="4000" i="1" dirty="0"/>
+          </a:p>
+        </p:txBody>
+      </p:sp>
+      <p:pic>
+        <p:nvPicPr>
+          <p:cNvPr id="5" name="Imagen 4">
+            <a:extLst>
+              <a:ext uri="{FF2B5EF4-FFF2-40B4-BE49-F238E27FC236}">
+                <a16:creationId xmlns:a16="http://schemas.microsoft.com/office/drawing/2014/main" id="{8AA59EDE-8DC6-4D79-95C9-0EAE795C4A5A}"/>
+              </a:ext>
+            </a:extLst>
+          </p:cNvPr>
+          <p:cNvPicPr>
+            <a:picLocks noChangeAspect="1"/>
+          </p:cNvPicPr>
+          <p:nvPr/>
+        </p:nvPicPr>
+        <p:blipFill>
+          <a:blip r:embed="rId2">
+            <a:extLst>
+              <a:ext uri="{28A0092B-C50C-407E-A947-70E740481C1C}">
+                <a14:useLocalDpi xmlns:a14="http://schemas.microsoft.com/office/drawing/2010/main" val="0"/>
+              </a:ext>
+            </a:extLst>
+          </a:blip>
+          <a:stretch>
+            <a:fillRect/>
+          </a:stretch>
+        </p:blipFill>
+        <p:spPr>
+          <a:xfrm>
+            <a:off x="111210" y="130481"/>
+            <a:ext cx="1453349" cy="1353975"/>
+          </a:xfrm>
+          <a:prstGeom prst="rect">
+            <a:avLst/>
+          </a:prstGeom>
+        </p:spPr>
+      </p:pic>
+      <p:pic>
+        <p:nvPicPr>
+          <p:cNvPr id="3" name="Imagen 2" descr="Diagrama&#10;&#10;Descripción generada automáticamente">
+            <a:extLst>
+              <a:ext uri="{FF2B5EF4-FFF2-40B4-BE49-F238E27FC236}">
+                <a16:creationId xmlns:a16="http://schemas.microsoft.com/office/drawing/2014/main" id="{A28F6BCF-A063-479A-843D-48E0E287A333}"/>
+              </a:ext>
+            </a:extLst>
+          </p:cNvPr>
+          <p:cNvPicPr>
+            <a:picLocks noChangeAspect="1"/>
+          </p:cNvPicPr>
+          <p:nvPr/>
+        </p:nvPicPr>
+        <p:blipFill>
+          <a:blip r:embed="rId3">
+            <a:extLst>
+              <a:ext uri="{28A0092B-C50C-407E-A947-70E740481C1C}">
+                <a14:useLocalDpi xmlns:a14="http://schemas.microsoft.com/office/drawing/2010/main" val="0"/>
+              </a:ext>
+            </a:extLst>
+          </a:blip>
+          <a:stretch>
+            <a:fillRect/>
+          </a:stretch>
+        </p:blipFill>
+        <p:spPr>
+          <a:xfrm>
+            <a:off x="1564559" y="1142914"/>
+            <a:ext cx="9529116" cy="5566957"/>
+          </a:xfrm>
+          <a:prstGeom prst="rect">
+            <a:avLst/>
+          </a:prstGeom>
+        </p:spPr>
+      </p:pic>
+    </p:spTree>
+    <p:extLst>
+      <p:ext uri="{BB962C8B-B14F-4D97-AF65-F5344CB8AC3E}">
+        <p14:creationId xmlns:p14="http://schemas.microsoft.com/office/powerpoint/2010/main" val="3170996602"/>
       </p:ext>
     </p:extLst>
   </p:cSld>

</xml_diff>